<commit_message>
modified ppts and updated solutions
</commit_message>
<xml_diff>
--- a/lecture_slides/6_Python Lesson - Control Flow - While and For Loops.pptx
+++ b/lecture_slides/6_Python Lesson - Control Flow - While and For Loops.pptx
@@ -299,7 +299,7 @@
 <file path=ppt/revisionInfo.xml><?xml version="1.0" encoding="utf-8"?>
 <p1510:revInfo xmlns:a="http://schemas.openxmlformats.org/drawingml/2006/main" xmlns:r="http://schemas.openxmlformats.org/officeDocument/2006/relationships" xmlns:p1510="http://schemas.microsoft.com/office/powerpoint/2015/10/main">
   <p1510:revLst>
-    <p1510:client id="{51909CD1-E085-4C74-9D62-D00632B243A6}" v="88" dt="2020-10-26T13:50:35.344"/>
+    <p1510:client id="{51909CD1-E085-4C74-9D62-D00632B243A6}" v="122" dt="2020-10-27T06:24:17.788"/>
   </p1510:revLst>
 </p1510:revInfo>
 </file>
@@ -309,7 +309,7 @@
   <pc:docChgLst>
     <pc:chgData name="Brandon Hoffman" userId="b3ee02141e2b4ef5" providerId="LiveId" clId="{51909CD1-E085-4C74-9D62-D00632B243A6}"/>
     <pc:docChg chg="undo custSel addSld delSld modSld">
-      <pc:chgData name="Brandon Hoffman" userId="b3ee02141e2b4ef5" providerId="LiveId" clId="{51909CD1-E085-4C74-9D62-D00632B243A6}" dt="2020-10-26T14:20:16.867" v="4820" actId="20577"/>
+      <pc:chgData name="Brandon Hoffman" userId="b3ee02141e2b4ef5" providerId="LiveId" clId="{51909CD1-E085-4C74-9D62-D00632B243A6}" dt="2020-10-27T06:24:17.788" v="4856"/>
       <pc:docMkLst>
         <pc:docMk/>
       </pc:docMkLst>
@@ -909,13 +909,13 @@
         </pc:sldMkLst>
       </pc:sldChg>
       <pc:sldChg chg="modSp add mod modAnim modNotesTx">
-        <pc:chgData name="Brandon Hoffman" userId="b3ee02141e2b4ef5" providerId="LiveId" clId="{51909CD1-E085-4C74-9D62-D00632B243A6}" dt="2020-10-26T14:12:36.004" v="4650" actId="20577"/>
+        <pc:chgData name="Brandon Hoffman" userId="b3ee02141e2b4ef5" providerId="LiveId" clId="{51909CD1-E085-4C74-9D62-D00632B243A6}" dt="2020-10-27T06:24:17.788" v="4856"/>
         <pc:sldMkLst>
           <pc:docMk/>
           <pc:sldMk cId="1430001190" sldId="348"/>
         </pc:sldMkLst>
         <pc:spChg chg="mod">
-          <ac:chgData name="Brandon Hoffman" userId="b3ee02141e2b4ef5" providerId="LiveId" clId="{51909CD1-E085-4C74-9D62-D00632B243A6}" dt="2020-10-26T12:36:02.848" v="3240" actId="20577"/>
+          <ac:chgData name="Brandon Hoffman" userId="b3ee02141e2b4ef5" providerId="LiveId" clId="{51909CD1-E085-4C74-9D62-D00632B243A6}" dt="2020-10-27T06:24:02.373" v="4855" actId="20577"/>
           <ac:spMkLst>
             <pc:docMk/>
             <pc:sldMk cId="1430001190" sldId="348"/>
@@ -955,13 +955,13 @@
         </pc:spChg>
       </pc:sldChg>
       <pc:sldChg chg="modSp add mod modNotesTx">
-        <pc:chgData name="Brandon Hoffman" userId="b3ee02141e2b4ef5" providerId="LiveId" clId="{51909CD1-E085-4C74-9D62-D00632B243A6}" dt="2020-10-26T14:16:40.452" v="4730" actId="20577"/>
+        <pc:chgData name="Brandon Hoffman" userId="b3ee02141e2b4ef5" providerId="LiveId" clId="{51909CD1-E085-4C74-9D62-D00632B243A6}" dt="2020-10-27T06:23:30.416" v="4822" actId="20577"/>
         <pc:sldMkLst>
           <pc:docMk/>
           <pc:sldMk cId="473311607" sldId="350"/>
         </pc:sldMkLst>
         <pc:spChg chg="mod">
-          <ac:chgData name="Brandon Hoffman" userId="b3ee02141e2b4ef5" providerId="LiveId" clId="{51909CD1-E085-4C74-9D62-D00632B243A6}" dt="2020-10-26T13:27:33.190" v="3768" actId="108"/>
+          <ac:chgData name="Brandon Hoffman" userId="b3ee02141e2b4ef5" providerId="LiveId" clId="{51909CD1-E085-4C74-9D62-D00632B243A6}" dt="2020-10-27T06:23:30.416" v="4822" actId="20577"/>
           <ac:spMkLst>
             <pc:docMk/>
             <pc:sldMk cId="473311607" sldId="350"/>
@@ -17748,7 +17748,7 @@
         <p:spPr>
           <a:xfrm>
             <a:off x="1150881" y="1459356"/>
-            <a:ext cx="6842238" cy="2862322"/>
+            <a:ext cx="6842238" cy="2585323"/>
           </a:xfrm>
           <a:prstGeom prst="rect">
             <a:avLst/>
@@ -17954,7 +17954,7 @@
                 <a:latin typeface="Courier New" panose="02070309020205020404" pitchFamily="49" charset="0"/>
                 <a:cs typeface="Courier New" panose="02070309020205020404" pitchFamily="49" charset="0"/>
               </a:rPr>
-              <a:t># More complicated with while loop</a:t>
+              <a:t># Much simpler with for loop</a:t>
             </a:r>
             <a:endParaRPr lang="en-US" sz="1800" dirty="0">
               <a:solidFill>
@@ -17966,23 +17966,6 @@
               <a:latin typeface="Courier New" panose="02070309020205020404" pitchFamily="49" charset="0"/>
               <a:cs typeface="Courier New" panose="02070309020205020404" pitchFamily="49" charset="0"/>
             </a:endParaRPr>
-          </a:p>
-          <a:p>
-            <a:pPr>
-              <a:buClr>
-                <a:schemeClr val="accent4"/>
-              </a:buClr>
-            </a:pPr>
-            <a:r>
-              <a:rPr lang="en-US" sz="1800" dirty="0">
-                <a:solidFill>
-                  <a:schemeClr val="accent2"/>
-                </a:solidFill>
-                <a:latin typeface="Courier New" panose="02070309020205020404" pitchFamily="49" charset="0"/>
-                <a:cs typeface="Courier New" panose="02070309020205020404" pitchFamily="49" charset="0"/>
-              </a:rPr>
-              <a:t>n = 0</a:t>
-            </a:r>
           </a:p>
           <a:p>
             <a:pPr>
@@ -18263,37 +18246,6 @@
                                           <p:spTgt spid="4">
                                             <p:txEl>
                                               <p:pRg st="8" end="8"/>
-                                            </p:txEl>
-                                          </p:spTgt>
-                                        </p:tgtEl>
-                                        <p:attrNameLst>
-                                          <p:attrName>style.visibility</p:attrName>
-                                        </p:attrNameLst>
-                                      </p:cBhvr>
-                                      <p:to>
-                                        <p:strVal val="visible"/>
-                                      </p:to>
-                                    </p:set>
-                                  </p:childTnLst>
-                                </p:cTn>
-                              </p:par>
-                              <p:par>
-                                <p:cTn id="11" presetID="1" presetClass="entr" presetSubtype="0" fill="hold" nodeType="withEffect">
-                                  <p:stCondLst>
-                                    <p:cond delay="0"/>
-                                  </p:stCondLst>
-                                  <p:childTnLst>
-                                    <p:set>
-                                      <p:cBhvr>
-                                        <p:cTn id="12" dur="1" fill="hold">
-                                          <p:stCondLst>
-                                            <p:cond delay="0"/>
-                                          </p:stCondLst>
-                                        </p:cTn>
-                                        <p:tgtEl>
-                                          <p:spTgt spid="4">
-                                            <p:txEl>
-                                              <p:pRg st="9" end="9"/>
                                             </p:txEl>
                                           </p:spTgt>
                                         </p:tgtEl>

</xml_diff>